<commit_message>
Arbeit Freitag 10.12 ISFH
Asuwertung python ...
</commit_message>
<xml_diff>
--- a/Masterarbeit/Wochenmeetings/Übersicht_EL_KW50.pptx
+++ b/Masterarbeit/Wochenmeetings/Übersicht_EL_KW50.pptx
@@ -990,7 +990,7 @@
           <a:p>
             <a:fld id="{74DC2A52-73E6-4EF3-A22B-333B4C1D6725}" type="datetimeFigureOut">
               <a:rPr lang="en-US" smtClean="0"/>
-              <a:t>12/8/2021</a:t>
+              <a:t>12/10/2021</a:t>
             </a:fld>
             <a:endParaRPr lang="en-US"/>
           </a:p>
@@ -3615,7 +3615,7 @@
                   <a:schemeClr val="hlink"/>
                 </a:solidFill>
               </a:rPr>
-              <a:t>KW 49</a:t>
+              <a:t>KW 50</a:t>
             </a:r>
           </a:p>
           <a:p>

</xml_diff>